<commit_message>
FINÁLNÍ PREZENTACE S WF
</commit_message>
<xml_diff>
--- a/ostatni/VIS_prezentace.pptx
+++ b/ostatni/VIS_prezentace.pptx
@@ -117,6 +117,11 @@
       </a:defRPr>
     </a:lvl9pPr>
   </p:defaultTextStyle>
+  <p:extLst>
+    <p:ext uri="{EFAFB233-063F-42B5-8137-9DF3F51BA10A}">
+      <p15:sldGuideLst xmlns:p15="http://schemas.microsoft.com/office/powerpoint/2012/main"/>
+    </p:ext>
+  </p:extLst>
 </p:presentation>
 </file>
 
@@ -3891,6 +3896,14 @@
 <file path=ppt/slides/slide14.xml><?xml version="1.0" encoding="utf-8"?>
 <p:sld xmlns:a="http://schemas.openxmlformats.org/drawingml/2006/main" xmlns:r="http://schemas.openxmlformats.org/officeDocument/2006/relationships" xmlns:p="http://schemas.openxmlformats.org/presentationml/2006/main">
   <p:cSld>
+    <p:bg>
+      <p:bgPr>
+        <a:solidFill>
+          <a:schemeClr val="bg1"/>
+        </a:solidFill>
+        <a:effectLst/>
+      </p:bgPr>
+    </p:bg>
     <p:spTree>
       <p:nvGrpSpPr>
         <p:cNvPr id="1" name=""/>
@@ -3905,6 +3918,66 @@
           <a:chExt cx="0" cy="0"/>
         </a:xfrm>
       </p:grpSpPr>
+      <p:sp useBgFill="1">
+        <p:nvSpPr>
+          <p:cNvPr id="14" name="Rectangle 13">
+            <a:extLst>
+              <a:ext uri="{FF2B5EF4-FFF2-40B4-BE49-F238E27FC236}">
+                <a16:creationId xmlns:a16="http://schemas.microsoft.com/office/drawing/2014/main" id="{7C98A213-5994-475E-B327-DC6EC27FBA8B}"/>
+              </a:ext>
+              <a:ext uri="{C183D7F6-B498-43B3-948B-1728B52AA6E4}">
+                <adec:decorative xmlns:adec="http://schemas.microsoft.com/office/drawing/2017/decorative" val="1"/>
+              </a:ext>
+            </a:extLst>
+          </p:cNvPr>
+          <p:cNvSpPr>
+            <a:spLocks noGrp="1" noRot="1" noChangeAspect="1" noMove="1" noResize="1" noEditPoints="1" noAdjustHandles="1" noChangeArrowheads="1" noChangeShapeType="1" noTextEdit="1"/>
+          </p:cNvSpPr>
+          <p:nvPr>
+            <p:extLst>
+              <p:ext uri="{386F3935-93C4-4BCD-93E2-E3B085C9AB24}">
+                <p16:designElem xmlns:p16="http://schemas.microsoft.com/office/powerpoint/2015/main" val="1"/>
+              </p:ext>
+            </p:extLst>
+          </p:nvPr>
+        </p:nvSpPr>
+        <p:spPr>
+          <a:xfrm>
+            <a:off x="0" y="0"/>
+            <a:ext cx="12188952" cy="6858000"/>
+          </a:xfrm>
+          <a:prstGeom prst="rect">
+            <a:avLst/>
+          </a:prstGeom>
+          <a:ln>
+            <a:noFill/>
+          </a:ln>
+        </p:spPr>
+        <p:style>
+          <a:lnRef idx="2">
+            <a:schemeClr val="accent1">
+              <a:shade val="50000"/>
+            </a:schemeClr>
+          </a:lnRef>
+          <a:fillRef idx="1">
+            <a:schemeClr val="accent1"/>
+          </a:fillRef>
+          <a:effectRef idx="0">
+            <a:schemeClr val="accent1"/>
+          </a:effectRef>
+          <a:fontRef idx="minor">
+            <a:schemeClr val="lt1"/>
+          </a:fontRef>
+        </p:style>
+        <p:txBody>
+          <a:bodyPr rtlCol="0" anchor="ctr"/>
+          <a:lstStyle/>
+          <a:p>
+            <a:pPr algn="ctr"/>
+            <a:endParaRPr lang="en-US"/>
+          </a:p>
+        </p:txBody>
+      </p:sp>
       <p:sp>
         <p:nvSpPr>
           <p:cNvPr id="2" name="Nadpis 1">
@@ -3921,48 +3994,491 @@
             <p:ph type="title"/>
           </p:nvPr>
         </p:nvSpPr>
-        <p:spPr/>
-        <p:txBody>
-          <a:bodyPr/>
-          <a:lstStyle/>
-          <a:p>
-            <a:r>
-              <a:rPr lang="cs-CZ" dirty="0"/>
-              <a:t>Webové stránky - </a:t>
-            </a:r>
-            <a:r>
-              <a:rPr lang="cs-CZ" dirty="0" err="1"/>
-              <a:t>wireframe</a:t>
-            </a:r>
-            <a:endParaRPr lang="cs-CZ" dirty="0"/>
-          </a:p>
-        </p:txBody>
-      </p:sp>
-      <p:sp>
-        <p:nvSpPr>
-          <p:cNvPr id="3" name="Zástupný obsah 2">
-            <a:extLst>
-              <a:ext uri="{FF2B5EF4-FFF2-40B4-BE49-F238E27FC236}">
-                <a16:creationId xmlns:a16="http://schemas.microsoft.com/office/drawing/2014/main" id="{B3873C8D-5479-7F04-3580-15B70C6F5D96}"/>
-              </a:ext>
-            </a:extLst>
-          </p:cNvPr>
-          <p:cNvSpPr>
-            <a:spLocks noGrp="1"/>
-          </p:cNvSpPr>
+        <p:spPr>
+          <a:xfrm>
+            <a:off x="638881" y="670218"/>
+            <a:ext cx="10909640" cy="1065836"/>
+          </a:xfrm>
+        </p:spPr>
+        <p:txBody>
+          <a:bodyPr vert="horz" lIns="91440" tIns="45720" rIns="91440" bIns="45720" rtlCol="0" anchor="ctr">
+            <a:normAutofit/>
+          </a:bodyPr>
+          <a:lstStyle/>
+          <a:p>
+            <a:pPr algn="ctr"/>
+            <a:r>
+              <a:rPr lang="en-US" sz="6600"/>
+              <a:t>Webové stránky - wireframe</a:t>
+            </a:r>
+          </a:p>
+        </p:txBody>
+      </p:sp>
+      <p:sp>
+        <p:nvSpPr>
+          <p:cNvPr id="16" name="sketch line">
+            <a:extLst>
+              <a:ext uri="{FF2B5EF4-FFF2-40B4-BE49-F238E27FC236}">
+                <a16:creationId xmlns:a16="http://schemas.microsoft.com/office/drawing/2014/main" id="{4B030A0D-0DAD-4A99-89BB-419527D6A64B}"/>
+              </a:ext>
+              <a:ext uri="{C183D7F6-B498-43B3-948B-1728B52AA6E4}">
+                <adec:decorative xmlns:adec="http://schemas.microsoft.com/office/drawing/2017/decorative" val="1"/>
+              </a:ext>
+            </a:extLst>
+          </p:cNvPr>
+          <p:cNvSpPr>
+            <a:spLocks noGrp="1" noRot="1" noChangeAspect="1" noMove="1" noResize="1" noEditPoints="1" noAdjustHandles="1" noChangeArrowheads="1" noChangeShapeType="1" noTextEdit="1"/>
+          </p:cNvSpPr>
+          <p:nvPr>
+            <p:extLst>
+              <p:ext uri="{386F3935-93C4-4BCD-93E2-E3B085C9AB24}">
+                <p16:designElem xmlns:p16="http://schemas.microsoft.com/office/powerpoint/2015/main" val="1"/>
+              </p:ext>
+            </p:extLst>
+          </p:nvPr>
+        </p:nvSpPr>
+        <p:spPr>
+          <a:xfrm>
+            <a:off x="3389376" y="1800088"/>
+            <a:ext cx="5410200" cy="18288"/>
+          </a:xfrm>
+          <a:custGeom>
+            <a:avLst/>
+            <a:gdLst>
+              <a:gd name="connsiteX0" fmla="*/ 0 w 5410200"/>
+              <a:gd name="connsiteY0" fmla="*/ 0 h 18288"/>
+              <a:gd name="connsiteX1" fmla="*/ 568071 w 5410200"/>
+              <a:gd name="connsiteY1" fmla="*/ 0 h 18288"/>
+              <a:gd name="connsiteX2" fmla="*/ 1298448 w 5410200"/>
+              <a:gd name="connsiteY2" fmla="*/ 0 h 18288"/>
+              <a:gd name="connsiteX3" fmla="*/ 1920621 w 5410200"/>
+              <a:gd name="connsiteY3" fmla="*/ 0 h 18288"/>
+              <a:gd name="connsiteX4" fmla="*/ 2488692 w 5410200"/>
+              <a:gd name="connsiteY4" fmla="*/ 0 h 18288"/>
+              <a:gd name="connsiteX5" fmla="*/ 3219069 w 5410200"/>
+              <a:gd name="connsiteY5" fmla="*/ 0 h 18288"/>
+              <a:gd name="connsiteX6" fmla="*/ 3895344 w 5410200"/>
+              <a:gd name="connsiteY6" fmla="*/ 0 h 18288"/>
+              <a:gd name="connsiteX7" fmla="*/ 4571619 w 5410200"/>
+              <a:gd name="connsiteY7" fmla="*/ 0 h 18288"/>
+              <a:gd name="connsiteX8" fmla="*/ 5410200 w 5410200"/>
+              <a:gd name="connsiteY8" fmla="*/ 0 h 18288"/>
+              <a:gd name="connsiteX9" fmla="*/ 5410200 w 5410200"/>
+              <a:gd name="connsiteY9" fmla="*/ 18288 h 18288"/>
+              <a:gd name="connsiteX10" fmla="*/ 4842129 w 5410200"/>
+              <a:gd name="connsiteY10" fmla="*/ 18288 h 18288"/>
+              <a:gd name="connsiteX11" fmla="*/ 4328160 w 5410200"/>
+              <a:gd name="connsiteY11" fmla="*/ 18288 h 18288"/>
+              <a:gd name="connsiteX12" fmla="*/ 3597783 w 5410200"/>
+              <a:gd name="connsiteY12" fmla="*/ 18288 h 18288"/>
+              <a:gd name="connsiteX13" fmla="*/ 3029712 w 5410200"/>
+              <a:gd name="connsiteY13" fmla="*/ 18288 h 18288"/>
+              <a:gd name="connsiteX14" fmla="*/ 2299335 w 5410200"/>
+              <a:gd name="connsiteY14" fmla="*/ 18288 h 18288"/>
+              <a:gd name="connsiteX15" fmla="*/ 1514856 w 5410200"/>
+              <a:gd name="connsiteY15" fmla="*/ 18288 h 18288"/>
+              <a:gd name="connsiteX16" fmla="*/ 892683 w 5410200"/>
+              <a:gd name="connsiteY16" fmla="*/ 18288 h 18288"/>
+              <a:gd name="connsiteX17" fmla="*/ 0 w 5410200"/>
+              <a:gd name="connsiteY17" fmla="*/ 18288 h 18288"/>
+              <a:gd name="connsiteX18" fmla="*/ 0 w 5410200"/>
+              <a:gd name="connsiteY18" fmla="*/ 0 h 18288"/>
+            </a:gdLst>
+            <a:ahLst/>
+            <a:cxnLst>
+              <a:cxn ang="0">
+                <a:pos x="connsiteX0" y="connsiteY0"/>
+              </a:cxn>
+              <a:cxn ang="0">
+                <a:pos x="connsiteX1" y="connsiteY1"/>
+              </a:cxn>
+              <a:cxn ang="0">
+                <a:pos x="connsiteX2" y="connsiteY2"/>
+              </a:cxn>
+              <a:cxn ang="0">
+                <a:pos x="connsiteX3" y="connsiteY3"/>
+              </a:cxn>
+              <a:cxn ang="0">
+                <a:pos x="connsiteX4" y="connsiteY4"/>
+              </a:cxn>
+              <a:cxn ang="0">
+                <a:pos x="connsiteX5" y="connsiteY5"/>
+              </a:cxn>
+              <a:cxn ang="0">
+                <a:pos x="connsiteX6" y="connsiteY6"/>
+              </a:cxn>
+              <a:cxn ang="0">
+                <a:pos x="connsiteX7" y="connsiteY7"/>
+              </a:cxn>
+              <a:cxn ang="0">
+                <a:pos x="connsiteX8" y="connsiteY8"/>
+              </a:cxn>
+              <a:cxn ang="0">
+                <a:pos x="connsiteX9" y="connsiteY9"/>
+              </a:cxn>
+              <a:cxn ang="0">
+                <a:pos x="connsiteX10" y="connsiteY10"/>
+              </a:cxn>
+              <a:cxn ang="0">
+                <a:pos x="connsiteX11" y="connsiteY11"/>
+              </a:cxn>
+              <a:cxn ang="0">
+                <a:pos x="connsiteX12" y="connsiteY12"/>
+              </a:cxn>
+              <a:cxn ang="0">
+                <a:pos x="connsiteX13" y="connsiteY13"/>
+              </a:cxn>
+              <a:cxn ang="0">
+                <a:pos x="connsiteX14" y="connsiteY14"/>
+              </a:cxn>
+              <a:cxn ang="0">
+                <a:pos x="connsiteX15" y="connsiteY15"/>
+              </a:cxn>
+              <a:cxn ang="0">
+                <a:pos x="connsiteX16" y="connsiteY16"/>
+              </a:cxn>
+              <a:cxn ang="0">
+                <a:pos x="connsiteX17" y="connsiteY17"/>
+              </a:cxn>
+              <a:cxn ang="0">
+                <a:pos x="connsiteX18" y="connsiteY18"/>
+              </a:cxn>
+            </a:cxnLst>
+            <a:rect l="l" t="t" r="r" b="b"/>
+            <a:pathLst>
+              <a:path w="5410200" h="18288" fill="none" extrusionOk="0">
+                <a:moveTo>
+                  <a:pt x="0" y="0"/>
+                </a:moveTo>
+                <a:cubicBezTo>
+                  <a:pt x="163050" y="-18707"/>
+                  <a:pt x="319321" y="-16364"/>
+                  <a:pt x="568071" y="0"/>
+                </a:cubicBezTo>
+                <a:cubicBezTo>
+                  <a:pt x="816821" y="16364"/>
+                  <a:pt x="1013224" y="-7268"/>
+                  <a:pt x="1298448" y="0"/>
+                </a:cubicBezTo>
+                <a:cubicBezTo>
+                  <a:pt x="1583672" y="7268"/>
+                  <a:pt x="1631711" y="-3367"/>
+                  <a:pt x="1920621" y="0"/>
+                </a:cubicBezTo>
+                <a:cubicBezTo>
+                  <a:pt x="2209531" y="3367"/>
+                  <a:pt x="2364420" y="-19184"/>
+                  <a:pt x="2488692" y="0"/>
+                </a:cubicBezTo>
+                <a:cubicBezTo>
+                  <a:pt x="2612964" y="19184"/>
+                  <a:pt x="3023298" y="-34627"/>
+                  <a:pt x="3219069" y="0"/>
+                </a:cubicBezTo>
+                <a:cubicBezTo>
+                  <a:pt x="3414840" y="34627"/>
+                  <a:pt x="3656810" y="24043"/>
+                  <a:pt x="3895344" y="0"/>
+                </a:cubicBezTo>
+                <a:cubicBezTo>
+                  <a:pt x="4133879" y="-24043"/>
+                  <a:pt x="4393984" y="-19577"/>
+                  <a:pt x="4571619" y="0"/>
+                </a:cubicBezTo>
+                <a:cubicBezTo>
+                  <a:pt x="4749255" y="19577"/>
+                  <a:pt x="5179928" y="-6281"/>
+                  <a:pt x="5410200" y="0"/>
+                </a:cubicBezTo>
+                <a:cubicBezTo>
+                  <a:pt x="5410730" y="6954"/>
+                  <a:pt x="5410934" y="12839"/>
+                  <a:pt x="5410200" y="18288"/>
+                </a:cubicBezTo>
+                <a:cubicBezTo>
+                  <a:pt x="5139060" y="6751"/>
+                  <a:pt x="5121593" y="31035"/>
+                  <a:pt x="4842129" y="18288"/>
+                </a:cubicBezTo>
+                <a:cubicBezTo>
+                  <a:pt x="4562665" y="5541"/>
+                  <a:pt x="4448273" y="9487"/>
+                  <a:pt x="4328160" y="18288"/>
+                </a:cubicBezTo>
+                <a:cubicBezTo>
+                  <a:pt x="4208047" y="27089"/>
+                  <a:pt x="3760936" y="22567"/>
+                  <a:pt x="3597783" y="18288"/>
+                </a:cubicBezTo>
+                <a:cubicBezTo>
+                  <a:pt x="3434630" y="14009"/>
+                  <a:pt x="3299718" y="33213"/>
+                  <a:pt x="3029712" y="18288"/>
+                </a:cubicBezTo>
+                <a:cubicBezTo>
+                  <a:pt x="2759706" y="3363"/>
+                  <a:pt x="2640159" y="27394"/>
+                  <a:pt x="2299335" y="18288"/>
+                </a:cubicBezTo>
+                <a:cubicBezTo>
+                  <a:pt x="1958511" y="9182"/>
+                  <a:pt x="1801186" y="28985"/>
+                  <a:pt x="1514856" y="18288"/>
+                </a:cubicBezTo>
+                <a:cubicBezTo>
+                  <a:pt x="1228526" y="7591"/>
+                  <a:pt x="1063509" y="-5305"/>
+                  <a:pt x="892683" y="18288"/>
+                </a:cubicBezTo>
+                <a:cubicBezTo>
+                  <a:pt x="721857" y="41881"/>
+                  <a:pt x="186945" y="-20897"/>
+                  <a:pt x="0" y="18288"/>
+                </a:cubicBezTo>
+                <a:cubicBezTo>
+                  <a:pt x="-570" y="9279"/>
+                  <a:pt x="132" y="5100"/>
+                  <a:pt x="0" y="0"/>
+                </a:cubicBezTo>
+                <a:close/>
+              </a:path>
+              <a:path w="5410200" h="18288" stroke="0" extrusionOk="0">
+                <a:moveTo>
+                  <a:pt x="0" y="0"/>
+                </a:moveTo>
+                <a:cubicBezTo>
+                  <a:pt x="285096" y="-4925"/>
+                  <a:pt x="376456" y="22268"/>
+                  <a:pt x="622173" y="0"/>
+                </a:cubicBezTo>
+                <a:cubicBezTo>
+                  <a:pt x="867890" y="-22268"/>
+                  <a:pt x="1031392" y="7228"/>
+                  <a:pt x="1136142" y="0"/>
+                </a:cubicBezTo>
+                <a:cubicBezTo>
+                  <a:pt x="1240892" y="-7228"/>
+                  <a:pt x="1561853" y="9877"/>
+                  <a:pt x="1920621" y="0"/>
+                </a:cubicBezTo>
+                <a:cubicBezTo>
+                  <a:pt x="2279389" y="-9877"/>
+                  <a:pt x="2367255" y="19546"/>
+                  <a:pt x="2542794" y="0"/>
+                </a:cubicBezTo>
+                <a:cubicBezTo>
+                  <a:pt x="2718333" y="-19546"/>
+                  <a:pt x="2866732" y="-22226"/>
+                  <a:pt x="3164967" y="0"/>
+                </a:cubicBezTo>
+                <a:cubicBezTo>
+                  <a:pt x="3463202" y="22226"/>
+                  <a:pt x="3568055" y="-2765"/>
+                  <a:pt x="3949446" y="0"/>
+                </a:cubicBezTo>
+                <a:cubicBezTo>
+                  <a:pt x="4330837" y="2765"/>
+                  <a:pt x="4287895" y="10557"/>
+                  <a:pt x="4517517" y="0"/>
+                </a:cubicBezTo>
+                <a:cubicBezTo>
+                  <a:pt x="4747139" y="-10557"/>
+                  <a:pt x="5149588" y="8716"/>
+                  <a:pt x="5410200" y="0"/>
+                </a:cubicBezTo>
+                <a:cubicBezTo>
+                  <a:pt x="5409517" y="5414"/>
+                  <a:pt x="5409480" y="12510"/>
+                  <a:pt x="5410200" y="18288"/>
+                </a:cubicBezTo>
+                <a:cubicBezTo>
+                  <a:pt x="5163327" y="41494"/>
+                  <a:pt x="5008749" y="10693"/>
+                  <a:pt x="4842129" y="18288"/>
+                </a:cubicBezTo>
+                <a:cubicBezTo>
+                  <a:pt x="4675509" y="25883"/>
+                  <a:pt x="4433401" y="-615"/>
+                  <a:pt x="4165854" y="18288"/>
+                </a:cubicBezTo>
+                <a:cubicBezTo>
+                  <a:pt x="3898308" y="37191"/>
+                  <a:pt x="3809032" y="-8710"/>
+                  <a:pt x="3543681" y="18288"/>
+                </a:cubicBezTo>
+                <a:cubicBezTo>
+                  <a:pt x="3278330" y="45286"/>
+                  <a:pt x="3073876" y="-15917"/>
+                  <a:pt x="2759202" y="18288"/>
+                </a:cubicBezTo>
+                <a:cubicBezTo>
+                  <a:pt x="2444528" y="52493"/>
+                  <a:pt x="2204144" y="3372"/>
+                  <a:pt x="1974723" y="18288"/>
+                </a:cubicBezTo>
+                <a:cubicBezTo>
+                  <a:pt x="1745302" y="33204"/>
+                  <a:pt x="1602335" y="31490"/>
+                  <a:pt x="1406652" y="18288"/>
+                </a:cubicBezTo>
+                <a:cubicBezTo>
+                  <a:pt x="1210969" y="5086"/>
+                  <a:pt x="923948" y="3161"/>
+                  <a:pt x="730377" y="18288"/>
+                </a:cubicBezTo>
+                <a:cubicBezTo>
+                  <a:pt x="536806" y="33415"/>
+                  <a:pt x="336496" y="-141"/>
+                  <a:pt x="0" y="18288"/>
+                </a:cubicBezTo>
+                <a:cubicBezTo>
+                  <a:pt x="-306" y="11061"/>
+                  <a:pt x="-655" y="7751"/>
+                  <a:pt x="0" y="0"/>
+                </a:cubicBezTo>
+                <a:close/>
+              </a:path>
+            </a:pathLst>
+          </a:custGeom>
+          <a:solidFill>
+            <a:schemeClr val="accent2"/>
+          </a:solidFill>
+          <a:ln w="41275" cap="rnd">
+            <a:solidFill>
+              <a:schemeClr val="accent2"/>
+            </a:solidFill>
+            <a:round/>
+            <a:extLst>
+              <a:ext uri="{C807C97D-BFC1-408E-A445-0C87EB9F89A2}">
+                <ask:lineSketchStyleProps xmlns:ask="http://schemas.microsoft.com/office/drawing/2018/sketchyshapes" sd="1219033472">
+                  <a:prstGeom prst="rect">
+                    <a:avLst/>
+                  </a:prstGeom>
+                  <ask:type>
+                    <ask:lineSketchFreehand/>
+                  </ask:type>
+                </ask:lineSketchStyleProps>
+              </a:ext>
+            </a:extLst>
+          </a:ln>
+        </p:spPr>
+        <p:style>
+          <a:lnRef idx="2">
+            <a:schemeClr val="accent1">
+              <a:shade val="50000"/>
+            </a:schemeClr>
+          </a:lnRef>
+          <a:fillRef idx="1">
+            <a:schemeClr val="accent1"/>
+          </a:fillRef>
+          <a:effectRef idx="0">
+            <a:schemeClr val="accent1"/>
+          </a:effectRef>
+          <a:fontRef idx="minor">
+            <a:schemeClr val="lt1"/>
+          </a:fontRef>
+        </p:style>
+        <p:txBody>
+          <a:bodyPr rtlCol="0" anchor="ctr"/>
+          <a:lstStyle/>
+          <a:p>
+            <a:pPr algn="ctr"/>
+            <a:endParaRPr lang="en-US"/>
+          </a:p>
+        </p:txBody>
+      </p:sp>
+      <p:pic>
+        <p:nvPicPr>
+          <p:cNvPr id="5" name="Zástupný obsah 4">
+            <a:extLst>
+              <a:ext uri="{FF2B5EF4-FFF2-40B4-BE49-F238E27FC236}">
+                <a16:creationId xmlns:a16="http://schemas.microsoft.com/office/drawing/2014/main" id="{D0809C4C-D636-5580-CABA-B747BF024C61}"/>
+              </a:ext>
+            </a:extLst>
+          </p:cNvPr>
+          <p:cNvPicPr>
+            <a:picLocks noGrp="1" noChangeAspect="1"/>
+          </p:cNvPicPr>
           <p:nvPr>
             <p:ph idx="1"/>
           </p:nvPr>
-        </p:nvSpPr>
-        <p:spPr/>
-        <p:txBody>
-          <a:bodyPr/>
-          <a:lstStyle/>
-          <a:p>
-            <a:endParaRPr lang="cs-CZ"/>
-          </a:p>
-        </p:txBody>
-      </p:sp>
+        </p:nvPicPr>
+        <p:blipFill>
+          <a:blip r:embed="rId2"/>
+          <a:stretch>
+            <a:fillRect/>
+          </a:stretch>
+        </p:blipFill>
+        <p:spPr>
+          <a:xfrm>
+            <a:off x="292608" y="3400397"/>
+            <a:ext cx="3758184" cy="2038814"/>
+          </a:xfrm>
+          <a:prstGeom prst="rect">
+            <a:avLst/>
+          </a:prstGeom>
+        </p:spPr>
+      </p:pic>
+      <p:pic>
+        <p:nvPicPr>
+          <p:cNvPr id="7" name="Obrázek 6">
+            <a:extLst>
+              <a:ext uri="{FF2B5EF4-FFF2-40B4-BE49-F238E27FC236}">
+                <a16:creationId xmlns:a16="http://schemas.microsoft.com/office/drawing/2014/main" id="{FDCE1E07-27D9-D468-51F7-CE9AF35AE336}"/>
+              </a:ext>
+            </a:extLst>
+          </p:cNvPr>
+          <p:cNvPicPr>
+            <a:picLocks noChangeAspect="1"/>
+          </p:cNvPicPr>
+          <p:nvPr/>
+        </p:nvPicPr>
+        <p:blipFill>
+          <a:blip r:embed="rId3"/>
+          <a:stretch>
+            <a:fillRect/>
+          </a:stretch>
+        </p:blipFill>
+        <p:spPr>
+          <a:xfrm>
+            <a:off x="4216908" y="3405095"/>
+            <a:ext cx="3758184" cy="2029419"/>
+          </a:xfrm>
+          <a:prstGeom prst="rect">
+            <a:avLst/>
+          </a:prstGeom>
+        </p:spPr>
+      </p:pic>
+      <p:pic>
+        <p:nvPicPr>
+          <p:cNvPr id="9" name="Obrázek 8">
+            <a:extLst>
+              <a:ext uri="{FF2B5EF4-FFF2-40B4-BE49-F238E27FC236}">
+                <a16:creationId xmlns:a16="http://schemas.microsoft.com/office/drawing/2014/main" id="{4B7A63B9-F6FD-A62C-DDEB-55842474DE08}"/>
+              </a:ext>
+            </a:extLst>
+          </p:cNvPr>
+          <p:cNvPicPr>
+            <a:picLocks noChangeAspect="1"/>
+          </p:cNvPicPr>
+          <p:nvPr/>
+        </p:nvPicPr>
+        <p:blipFill>
+          <a:blip r:embed="rId4"/>
+          <a:stretch>
+            <a:fillRect/>
+          </a:stretch>
+        </p:blipFill>
+        <p:spPr>
+          <a:xfrm>
+            <a:off x="8058149" y="3409297"/>
+            <a:ext cx="3932461" cy="2025217"/>
+          </a:xfrm>
+          <a:prstGeom prst="rect">
+            <a:avLst/>
+          </a:prstGeom>
+        </p:spPr>
+      </p:pic>
     </p:spTree>
     <p:extLst>
       <p:ext uri="{BB962C8B-B14F-4D97-AF65-F5344CB8AC3E}">

</xml_diff>